<commit_message>
Updated Several First Semester Design Docs
Also made small UI update to the teacher landing page.
</commit_message>
<xml_diff>
--- a/Sprint 3/client presentation/DanceSoft powerpoint sprint 3.pptx
+++ b/Sprint 3/client presentation/DanceSoft powerpoint sprint 3.pptx
@@ -7,12 +7,12 @@
   <p:sldIdLst>
     <p:sldId id="256" r:id="rId2"/>
     <p:sldId id="266" r:id="rId3"/>
-    <p:sldId id="257" r:id="rId4"/>
-    <p:sldId id="271" r:id="rId5"/>
-    <p:sldId id="269" r:id="rId6"/>
-    <p:sldId id="259" r:id="rId7"/>
-    <p:sldId id="279" r:id="rId8"/>
-    <p:sldId id="278" r:id="rId9"/>
+    <p:sldId id="283" r:id="rId4"/>
+    <p:sldId id="284" r:id="rId5"/>
+    <p:sldId id="285" r:id="rId6"/>
+    <p:sldId id="269" r:id="rId7"/>
+    <p:sldId id="259" r:id="rId8"/>
+    <p:sldId id="279" r:id="rId9"/>
     <p:sldId id="277" r:id="rId10"/>
     <p:sldId id="275" r:id="rId11"/>
     <p:sldId id="276" r:id="rId12"/>
@@ -369,7 +369,7 @@
           <a:p>
             <a:fld id="{4BDF68E2-58F2-4D09-BE8B-E3BD06533059}" type="datetimeFigureOut">
               <a:rPr lang="en-US" dirty="0"/>
-              <a:t>12/3/2015</a:t>
+              <a:t>12/7/2015</a:t>
             </a:fld>
             <a:endParaRPr lang="en-US" dirty="0"/>
           </a:p>
@@ -572,7 +572,7 @@
           <a:p>
             <a:fld id="{2E2D6473-DF6D-4702-B328-E0DD40540A4E}" type="datetimeFigureOut">
               <a:rPr lang="en-US" dirty="0"/>
-              <a:t>12/3/2015</a:t>
+              <a:t>12/7/2015</a:t>
             </a:fld>
             <a:endParaRPr lang="en-US" dirty="0"/>
           </a:p>
@@ -823,7 +823,7 @@
           <a:p>
             <a:fld id="{E26F7E3A-B166-407D-9866-32884E7D5B37}" type="datetimeFigureOut">
               <a:rPr lang="en-US" dirty="0"/>
-              <a:t>12/3/2015</a:t>
+              <a:t>12/7/2015</a:t>
             </a:fld>
             <a:endParaRPr lang="en-US" dirty="0"/>
           </a:p>
@@ -992,7 +992,7 @@
           <a:p>
             <a:fld id="{528FC5F6-F338-4AE4-BB23-26385BCFC423}" type="datetimeFigureOut">
               <a:rPr lang="en-US" dirty="0"/>
-              <a:t>12/3/2015</a:t>
+              <a:t>12/7/2015</a:t>
             </a:fld>
             <a:endParaRPr lang="en-US" dirty="0"/>
           </a:p>
@@ -1330,7 +1330,7 @@
           <a:p>
             <a:fld id="{20EBB0C4-6273-4C6E-B9BD-2EDC30F1CD52}" type="datetimeFigureOut">
               <a:rPr lang="en-US" dirty="0"/>
-              <a:t>12/3/2015</a:t>
+              <a:t>12/7/2015</a:t>
             </a:fld>
             <a:endParaRPr lang="en-US" dirty="0"/>
           </a:p>
@@ -1600,7 +1600,7 @@
           <a:p>
             <a:fld id="{19AB4D41-86C1-4908-B66A-0B50CEB3BF29}" type="datetimeFigureOut">
               <a:rPr lang="en-US" dirty="0"/>
-              <a:t>12/3/2015</a:t>
+              <a:t>12/7/2015</a:t>
             </a:fld>
             <a:endParaRPr lang="en-US" dirty="0"/>
           </a:p>
@@ -1974,7 +1974,7 @@
           <a:p>
             <a:fld id="{E6426E2C-56C1-4E0D-A793-0088A7FDD37E}" type="datetimeFigureOut">
               <a:rPr lang="en-US" dirty="0"/>
-              <a:t>12/3/2015</a:t>
+              <a:t>12/7/2015</a:t>
             </a:fld>
             <a:endParaRPr lang="en-US" dirty="0"/>
           </a:p>
@@ -2087,7 +2087,7 @@
           <a:p>
             <a:fld id="{C8C39B41-D8B5-4052-B551-9B5525EAA8B6}" type="datetimeFigureOut">
               <a:rPr lang="en-US" dirty="0"/>
-              <a:t>12/3/2015</a:t>
+              <a:t>12/7/2015</a:t>
             </a:fld>
             <a:endParaRPr lang="en-US" dirty="0"/>
           </a:p>
@@ -2253,7 +2253,7 @@
           <a:p>
             <a:fld id="{4D94136C-8742-45B2-AF27-D93DF72833A9}" type="datetimeFigureOut">
               <a:rPr lang="en-US" dirty="0"/>
-              <a:t>12/3/2015</a:t>
+              <a:t>12/7/2015</a:t>
             </a:fld>
             <a:endParaRPr lang="en-US" dirty="0"/>
           </a:p>
@@ -2603,7 +2603,7 @@
           <a:p>
             <a:fld id="{32ABBEA6-7C60-4B02-AE87-00D78D8422AF}" type="datetimeFigureOut">
               <a:rPr lang="en-US" dirty="0"/>
-              <a:t>12/3/2015</a:t>
+              <a:t>12/7/2015</a:t>
             </a:fld>
             <a:endParaRPr lang="en-US" dirty="0"/>
           </a:p>
@@ -2981,7 +2981,7 @@
           <a:p>
             <a:fld id="{C9CAD897-D46E-4AD2-BD9B-49DD3E640873}" type="datetimeFigureOut">
               <a:rPr lang="en-US" dirty="0"/>
-              <a:t>12/3/2015</a:t>
+              <a:t>12/7/2015</a:t>
             </a:fld>
             <a:endParaRPr lang="en-US" dirty="0"/>
           </a:p>
@@ -3263,7 +3263,7 @@
           <a:p>
             <a:fld id="{98624D31-43A5-475A-80CF-332C9F6DCF35}" type="datetimeFigureOut">
               <a:rPr lang="en-US" dirty="0"/>
-              <a:t>12/3/2015</a:t>
+              <a:t>12/7/2015</a:t>
             </a:fld>
             <a:endParaRPr lang="en-US" dirty="0"/>
           </a:p>
@@ -3884,7 +3884,7 @@
           <a:p>
             <a:r>
               <a:rPr lang="en-US" dirty="0" smtClean="0"/>
-              <a:t>Prototype</a:t>
+              <a:t>Prototype: Starting Pages</a:t>
             </a:r>
             <a:endParaRPr lang="en-US" dirty="0"/>
           </a:p>
@@ -3937,7 +3937,6 @@
               <a:rPr lang="en-US" dirty="0" smtClean="0"/>
               <a:t>Log in:                                                                                             Landing Pages:</a:t>
             </a:r>
-            <a:endParaRPr lang="en-US" dirty="0" smtClean="0"/>
           </a:p>
           <a:p>
             <a:endParaRPr lang="en-US" dirty="0"/>
@@ -4058,7 +4057,7 @@
           <a:p>
             <a:r>
               <a:rPr lang="en-US" dirty="0" smtClean="0"/>
-              <a:t>More pages</a:t>
+              <a:t>Prototype: Add and Assign</a:t>
             </a:r>
             <a:endParaRPr lang="en-US" dirty="0"/>
           </a:p>
@@ -4205,7 +4204,7 @@
           <a:p>
             <a:r>
               <a:rPr lang="en-US" dirty="0" smtClean="0"/>
-              <a:t>More Pages</a:t>
+              <a:t>Prototype: Role</a:t>
             </a:r>
             <a:endParaRPr lang="en-US" dirty="0"/>
           </a:p>
@@ -4352,7 +4351,7 @@
           <a:p>
             <a:r>
               <a:rPr lang="en-US" dirty="0" smtClean="0"/>
-              <a:t>More Pages</a:t>
+              <a:t>Prototype: Search</a:t>
             </a:r>
             <a:endParaRPr lang="en-US" dirty="0"/>
           </a:p>
@@ -4829,11 +4828,7 @@
             </a:r>
             <a:r>
               <a:rPr lang="en-US" sz="3200" dirty="0" smtClean="0"/>
-              <a:t>ox budget no currently decided</a:t>
-            </a:r>
-            <a:r>
-              <a:rPr lang="en-US" sz="3200" dirty="0" smtClean="0"/>
-              <a:t> </a:t>
+              <a:t>ox budget not currently decided </a:t>
             </a:r>
           </a:p>
           <a:p>
@@ -4849,7 +4844,6 @@
               <a:rPr lang="en-US" sz="3200" dirty="0" smtClean="0"/>
               <a:t>Property: All open source, no licensing issues</a:t>
             </a:r>
-            <a:endParaRPr lang="en-US" sz="3200" dirty="0" smtClean="0"/>
           </a:p>
           <a:p>
             <a:pPr>
@@ -4963,7 +4957,6 @@
               <a:rPr lang="en-US" sz="2000" dirty="0" smtClean="0"/>
               <a:t>Team worked effectively together overall</a:t>
             </a:r>
-            <a:endParaRPr lang="en-US" sz="2000" dirty="0" smtClean="0"/>
           </a:p>
           <a:p>
             <a:pPr>
@@ -4991,7 +4984,6 @@
               <a:rPr lang="en-US" sz="2000" dirty="0" smtClean="0"/>
               <a:t>Small dialog bug in assign class page currently   </a:t>
             </a:r>
-            <a:endParaRPr lang="en-US" sz="2000" dirty="0" smtClean="0"/>
           </a:p>
           <a:p>
             <a:pPr lvl="1">
@@ -5010,7 +5002,23 @@
             </a:pPr>
             <a:r>
               <a:rPr lang="en-US" sz="2000" dirty="0" smtClean="0"/>
-              <a:t>Team let other classes interfere with team efficiency at times outside of meetings</a:t>
+              <a:t>Team let </a:t>
+            </a:r>
+            <a:r>
+              <a:rPr lang="en-US" sz="2000" smtClean="0"/>
+              <a:t>other </a:t>
+            </a:r>
+            <a:r>
+              <a:rPr lang="en-US" sz="2000" smtClean="0"/>
+              <a:t>obligations</a:t>
+            </a:r>
+            <a:r>
+              <a:rPr lang="en-US" sz="2000" smtClean="0"/>
+              <a:t> </a:t>
+            </a:r>
+            <a:r>
+              <a:rPr lang="en-US" sz="2000" dirty="0" smtClean="0"/>
+              <a:t>interfere with team efficiency at times outside of meetings</a:t>
             </a:r>
           </a:p>
           <a:p>
@@ -5022,7 +5030,6 @@
               <a:rPr lang="en-US" sz="2000" dirty="0" smtClean="0"/>
               <a:t>Were unable to tie individual functions together before end of semester (will be addressed during winter break)</a:t>
             </a:r>
-            <a:endParaRPr lang="en-US" sz="2000" dirty="0" smtClean="0"/>
           </a:p>
         </p:txBody>
       </p:sp>
@@ -5127,17 +5134,8 @@
             </a:pPr>
             <a:r>
               <a:rPr lang="en-US" sz="2200" dirty="0" smtClean="0"/>
-              <a:t>Continue to keep </a:t>
-            </a:r>
-            <a:r>
-              <a:rPr lang="en-US" sz="2200" dirty="0" smtClean="0"/>
-              <a:t>interfaces as simple as </a:t>
-            </a:r>
-            <a:r>
-              <a:rPr lang="en-US" sz="2200" dirty="0" smtClean="0"/>
-              <a:t>possible for user, while not compromising the wanted functionality</a:t>
-            </a:r>
-            <a:endParaRPr lang="en-US" sz="2200" dirty="0" smtClean="0"/>
+              <a:t>Continue to keep interfaces as simple as possible for user, while not compromising the wanted functionality</a:t>
+            </a:r>
           </a:p>
           <a:p>
             <a:pPr lvl="1">
@@ -5188,11 +5186,7 @@
             </a:pPr>
             <a:r>
               <a:rPr lang="en-US" sz="2200" dirty="0" smtClean="0"/>
-              <a:t>Encryption of the </a:t>
-            </a:r>
-            <a:r>
-              <a:rPr lang="en-US" sz="2200" dirty="0" smtClean="0"/>
-              <a:t>data</a:t>
+              <a:t>Encryption of the data</a:t>
             </a:r>
           </a:p>
           <a:p>
@@ -5204,7 +5198,6 @@
               <a:rPr lang="en-US" sz="2200" dirty="0" smtClean="0"/>
               <a:t>Protect user data</a:t>
             </a:r>
-            <a:endParaRPr lang="en-US" sz="2200" dirty="0" smtClean="0"/>
           </a:p>
           <a:p>
             <a:pPr marL="0" indent="0">
@@ -5296,13 +5289,8 @@
             </a:pPr>
             <a:r>
               <a:rPr lang="en-US" dirty="0" smtClean="0"/>
-              <a:t>Winter Break(12/16/15 -1/11/16) – First semester clean up, student </a:t>
-            </a:r>
-            <a:r>
-              <a:rPr lang="en-US" dirty="0" smtClean="0"/>
-              <a:t>interface, Tie functions together</a:t>
-            </a:r>
-            <a:endParaRPr lang="en-US" dirty="0" smtClean="0"/>
+              <a:t>Winter Break(12/16/15 -1/11/16) – First semester clean up, student interface, Tie functions together</a:t>
+            </a:r>
           </a:p>
           <a:p>
             <a:pPr marL="0" indent="0">
@@ -5326,11 +5314,7 @@
             </a:r>
             <a:r>
               <a:rPr lang="en-US" dirty="0" smtClean="0"/>
-              <a:t>payroll, </a:t>
-            </a:r>
-            <a:r>
-              <a:rPr lang="en-US" dirty="0" smtClean="0"/>
-              <a:t>testing</a:t>
+              <a:t>payroll, testing</a:t>
             </a:r>
             <a:endParaRPr lang="en-US" dirty="0"/>
           </a:p>
@@ -5364,11 +5348,7 @@
             </a:r>
             <a:r>
               <a:rPr lang="en-US" dirty="0" smtClean="0"/>
-              <a:t>backlog or student interface, </a:t>
-            </a:r>
-            <a:r>
-              <a:rPr lang="en-US" dirty="0" smtClean="0"/>
-              <a:t>testing</a:t>
+              <a:t>backlog or student interface, testing</a:t>
             </a:r>
             <a:endParaRPr lang="en-US" dirty="0"/>
           </a:p>
@@ -5386,11 +5366,7 @@
             </a:r>
             <a:r>
               <a:rPr lang="en-US" dirty="0" smtClean="0"/>
-              <a:t>) – Clean up GUI work, Final Testing, Final </a:t>
-            </a:r>
-            <a:r>
-              <a:rPr lang="en-US" dirty="0" smtClean="0"/>
-              <a:t>production,  Design fair preparation </a:t>
+              <a:t>) – Clean up GUI work, Final Testing, Final production,  Design fair preparation </a:t>
             </a:r>
             <a:endParaRPr lang="en-US" dirty="0"/>
           </a:p>
@@ -5696,11 +5672,7 @@
             </a:pPr>
             <a:r>
               <a:rPr lang="en-US" altLang="zh-CN" sz="2800" dirty="0" smtClean="0"/>
-              <a:t>Sprint 3: Search pages, Update pages, Add information pages, Role </a:t>
-            </a:r>
-            <a:r>
-              <a:rPr lang="en-US" altLang="zh-CN" sz="2800" dirty="0" smtClean="0"/>
-              <a:t>sheet</a:t>
+              <a:t>Sprint 3: Search pages, Update pages, Add information pages, Role sheet</a:t>
             </a:r>
           </a:p>
           <a:p>
@@ -5710,11 +5682,7 @@
             </a:pPr>
             <a:r>
               <a:rPr lang="en-US" sz="2800" dirty="0" smtClean="0"/>
-              <a:t>Sprint </a:t>
-            </a:r>
-            <a:r>
-              <a:rPr lang="en-US" sz="2800" dirty="0" smtClean="0"/>
-              <a:t>reviews and </a:t>
+              <a:t>Sprint reviews and </a:t>
             </a:r>
             <a:r>
               <a:rPr lang="en-US" sz="2800" dirty="0"/>
@@ -5880,7 +5848,9 @@
         </p:nvSpPr>
         <p:spPr/>
         <p:txBody>
-          <a:bodyPr/>
+          <a:bodyPr>
+            <a:normAutofit fontScale="77500" lnSpcReduction="20000"/>
+          </a:bodyPr>
           <a:lstStyle/>
           <a:p>
             <a:pPr>
@@ -5952,6 +5922,96 @@
               <a:t>information when user request it. </a:t>
             </a:r>
             <a:endParaRPr lang="en-US" sz="2000" dirty="0" smtClean="0"/>
+          </a:p>
+          <a:p>
+            <a:pPr>
+              <a:buFont typeface="Wingdings" panose="05000000000000000000" pitchFamily="2" charset="2"/>
+              <a:buChar char="§"/>
+            </a:pPr>
+            <a:r>
+              <a:rPr lang="en-US" altLang="zh-CN" dirty="0"/>
+              <a:t>Development Constraints</a:t>
+            </a:r>
+          </a:p>
+          <a:p>
+            <a:pPr lvl="1">
+              <a:buFont typeface="Wingdings" panose="05000000000000000000" pitchFamily="2" charset="2"/>
+              <a:buChar char="§"/>
+            </a:pPr>
+            <a:r>
+              <a:rPr lang="en-US" altLang="zh-CN" dirty="0"/>
+              <a:t>Project must be open source. </a:t>
+            </a:r>
+          </a:p>
+          <a:p>
+            <a:pPr lvl="1">
+              <a:buFont typeface="Wingdings" panose="05000000000000000000" pitchFamily="2" charset="2"/>
+              <a:buChar char="§"/>
+            </a:pPr>
+            <a:r>
+              <a:rPr lang="en-US" altLang="zh-CN" dirty="0"/>
+              <a:t>Clients primarily run Mac so the project must work in this environment.</a:t>
+            </a:r>
+          </a:p>
+          <a:p>
+            <a:pPr lvl="1">
+              <a:buFont typeface="Wingdings" panose="05000000000000000000" pitchFamily="2" charset="2"/>
+              <a:buChar char="§"/>
+            </a:pPr>
+            <a:r>
+              <a:rPr lang="en-US" altLang="zh-CN" dirty="0"/>
+              <a:t> Wi-Fi/bandwidth issues for the </a:t>
+            </a:r>
+            <a:r>
+              <a:rPr lang="en-US" altLang="zh-CN" dirty="0" smtClean="0"/>
+              <a:t>academy</a:t>
+            </a:r>
+          </a:p>
+          <a:p>
+            <a:pPr>
+              <a:buFont typeface="Wingdings" panose="05000000000000000000" pitchFamily="2" charset="2"/>
+              <a:buChar char="§"/>
+            </a:pPr>
+            <a:r>
+              <a:rPr lang="en-US" altLang="zh-CN" dirty="0"/>
+              <a:t>Project functionality</a:t>
+            </a:r>
+          </a:p>
+          <a:p>
+            <a:pPr lvl="1">
+              <a:buFont typeface="Wingdings" panose="05000000000000000000" pitchFamily="2" charset="2"/>
+              <a:buChar char="§"/>
+            </a:pPr>
+            <a:r>
+              <a:rPr lang="en-US" altLang="zh-CN" dirty="0"/>
+              <a:t>Administers can see the information for every teacher and student. </a:t>
+            </a:r>
+          </a:p>
+          <a:p>
+            <a:pPr lvl="1">
+              <a:buFont typeface="Wingdings" panose="05000000000000000000" pitchFamily="2" charset="2"/>
+              <a:buChar char="§"/>
+            </a:pPr>
+            <a:r>
+              <a:rPr lang="en-US" altLang="zh-CN" dirty="0"/>
+              <a:t>Teachers can see his or her student’s information and classes schedules.</a:t>
+            </a:r>
+          </a:p>
+          <a:p>
+            <a:pPr lvl="1">
+              <a:buFont typeface="Wingdings" panose="05000000000000000000" pitchFamily="2" charset="2"/>
+              <a:buChar char="§"/>
+            </a:pPr>
+            <a:r>
+              <a:rPr lang="en-US" altLang="zh-CN" dirty="0"/>
+              <a:t> Students can see classes schedules and register for classes.</a:t>
+            </a:r>
+          </a:p>
+          <a:p>
+            <a:pPr marL="201168" lvl="1" indent="0">
+              <a:buNone/>
+            </a:pPr>
+            <a:endParaRPr lang="en-US" altLang="zh-CN" dirty="0"/>
           </a:p>
           <a:p>
             <a:pPr>
@@ -5965,7 +6025,7 @@
     </p:spTree>
     <p:extLst>
       <p:ext uri="{BB962C8B-B14F-4D97-AF65-F5344CB8AC3E}">
-        <p14:creationId xmlns:p14="http://schemas.microsoft.com/office/powerpoint/2010/main" val="3116441181"/>
+        <p14:creationId xmlns:p14="http://schemas.microsoft.com/office/powerpoint/2010/main" val="2433733031"/>
       </p:ext>
     </p:extLst>
   </p:cSld>
@@ -6015,138 +6075,73 @@
           <a:lstStyle/>
           <a:p>
             <a:r>
-              <a:rPr lang="en-US" altLang="zh-CN" dirty="0"/>
-              <a:t>Project Overview</a:t>
+              <a:rPr lang="en-US" altLang="zh-CN" dirty="0" smtClean="0"/>
+              <a:t>Database Architecture</a:t>
             </a:r>
             <a:endParaRPr lang="zh-CN" altLang="en-US" dirty="0"/>
           </a:p>
         </p:txBody>
       </p:sp>
-      <p:sp>
-        <p:nvSpPr>
-          <p:cNvPr id="3" name="Content Placeholder 2"/>
-          <p:cNvSpPr>
-            <a:spLocks noGrp="1"/>
-          </p:cNvSpPr>
+      <p:pic>
+        <p:nvPicPr>
+          <p:cNvPr id="1026" name="Picture 2"/>
+          <p:cNvPicPr>
+            <a:picLocks noGrp="1" noChangeAspect="1" noChangeArrowheads="1"/>
+          </p:cNvPicPr>
           <p:nvPr>
             <p:ph idx="1"/>
           </p:nvPr>
-        </p:nvSpPr>
-        <p:spPr/>
-        <p:txBody>
-          <a:bodyPr/>
-          <a:lstStyle/>
-          <a:p>
-            <a:pPr>
-              <a:buFont typeface="Wingdings" panose="05000000000000000000" pitchFamily="2" charset="2"/>
-              <a:buChar char="§"/>
-            </a:pPr>
-            <a:r>
-              <a:rPr lang="en-US" altLang="zh-CN" dirty="0"/>
-              <a:t>Development </a:t>
-            </a:r>
-            <a:r>
-              <a:rPr lang="en-US" altLang="zh-CN" dirty="0" smtClean="0"/>
-              <a:t>Constraints</a:t>
-            </a:r>
-            <a:endParaRPr lang="en-US" altLang="zh-CN" dirty="0"/>
-          </a:p>
-          <a:p>
-            <a:pPr lvl="1">
-              <a:buFont typeface="Wingdings" panose="05000000000000000000" pitchFamily="2" charset="2"/>
-              <a:buChar char="§"/>
-            </a:pPr>
-            <a:r>
-              <a:rPr lang="en-US" altLang="zh-CN" dirty="0" smtClean="0"/>
-              <a:t>Project must be open source. </a:t>
-            </a:r>
-          </a:p>
-          <a:p>
-            <a:pPr lvl="1">
-              <a:buFont typeface="Wingdings" panose="05000000000000000000" pitchFamily="2" charset="2"/>
-              <a:buChar char="§"/>
-            </a:pPr>
-            <a:r>
-              <a:rPr lang="en-US" altLang="zh-CN" dirty="0" smtClean="0"/>
-              <a:t>Clients primarily run Mac so the project must work in this environment.</a:t>
-            </a:r>
-          </a:p>
-          <a:p>
-            <a:pPr lvl="1">
-              <a:buFont typeface="Wingdings" panose="05000000000000000000" pitchFamily="2" charset="2"/>
-              <a:buChar char="§"/>
-            </a:pPr>
-            <a:r>
-              <a:rPr lang="en-US" altLang="zh-CN" dirty="0" smtClean="0"/>
-              <a:t> </a:t>
-            </a:r>
-            <a:r>
-              <a:rPr lang="en-US" altLang="zh-CN" dirty="0"/>
-              <a:t>Wi-Fi/bandwidth </a:t>
-            </a:r>
-            <a:r>
-              <a:rPr lang="en-US" altLang="zh-CN" dirty="0" smtClean="0"/>
-              <a:t>issues for the academy</a:t>
-            </a:r>
-          </a:p>
-          <a:p>
-            <a:pPr>
-              <a:buFont typeface="Wingdings" panose="05000000000000000000" pitchFamily="2" charset="2"/>
-              <a:buChar char="§"/>
-            </a:pPr>
-            <a:r>
-              <a:rPr lang="en-US" altLang="zh-CN" dirty="0" smtClean="0"/>
-              <a:t>Project functionality</a:t>
-            </a:r>
-          </a:p>
-          <a:p>
-            <a:pPr lvl="1">
-              <a:buFont typeface="Wingdings" panose="05000000000000000000" pitchFamily="2" charset="2"/>
-              <a:buChar char="§"/>
-            </a:pPr>
-            <a:r>
-              <a:rPr lang="en-US" altLang="zh-CN" dirty="0" smtClean="0"/>
-              <a:t>Administers can see the information for every teacher and student. </a:t>
-            </a:r>
-          </a:p>
-          <a:p>
-            <a:pPr lvl="1">
-              <a:buFont typeface="Wingdings" panose="05000000000000000000" pitchFamily="2" charset="2"/>
-              <a:buChar char="§"/>
-            </a:pPr>
-            <a:r>
-              <a:rPr lang="en-US" altLang="zh-CN" dirty="0" smtClean="0"/>
-              <a:t>Teachers can see his or her student’s information and classes schedules.</a:t>
-            </a:r>
-          </a:p>
-          <a:p>
-            <a:pPr lvl="1">
-              <a:buFont typeface="Wingdings" panose="05000000000000000000" pitchFamily="2" charset="2"/>
-              <a:buChar char="§"/>
-            </a:pPr>
-            <a:r>
-              <a:rPr lang="en-US" altLang="zh-CN" dirty="0" smtClean="0"/>
-              <a:t> Students can see </a:t>
-            </a:r>
-            <a:r>
-              <a:rPr lang="en-US" altLang="zh-CN" dirty="0"/>
-              <a:t>classes </a:t>
-            </a:r>
-            <a:r>
-              <a:rPr lang="en-US" altLang="zh-CN" dirty="0" smtClean="0"/>
-              <a:t>schedules and register for classes.</a:t>
-            </a:r>
-            <a:endParaRPr lang="en-US" altLang="zh-CN" dirty="0"/>
-          </a:p>
-          <a:p>
-            <a:endParaRPr lang="zh-CN" altLang="en-US" dirty="0"/>
-          </a:p>
-        </p:txBody>
-      </p:sp>
+        </p:nvPicPr>
+        <p:blipFill>
+          <a:blip r:embed="rId2">
+            <a:extLst>
+              <a:ext uri="{28A0092B-C50C-407E-A947-70E740481C1C}">
+                <a14:useLocalDpi xmlns:a14="http://schemas.microsoft.com/office/drawing/2010/main" val="0"/>
+              </a:ext>
+            </a:extLst>
+          </a:blip>
+          <a:srcRect/>
+          <a:stretch>
+            <a:fillRect/>
+          </a:stretch>
+        </p:blipFill>
+        <p:spPr bwMode="auto">
+          <a:xfrm>
+            <a:off x="1786909" y="1846263"/>
+            <a:ext cx="8678508" cy="4022725"/>
+          </a:xfrm>
+          <a:prstGeom prst="rect">
+            <a:avLst/>
+          </a:prstGeom>
+          <a:noFill/>
+          <a:ln>
+            <a:noFill/>
+          </a:ln>
+          <a:extLst>
+            <a:ext uri="{909E8E84-426E-40DD-AFC4-6F175D3DCCD1}">
+              <a14:hiddenFill xmlns:a14="http://schemas.microsoft.com/office/drawing/2010/main">
+                <a:solidFill>
+                  <a:schemeClr val="accent1"/>
+                </a:solidFill>
+              </a14:hiddenFill>
+            </a:ext>
+            <a:ext uri="{91240B29-F687-4F45-9708-019B960494DF}">
+              <a14:hiddenLine xmlns:a14="http://schemas.microsoft.com/office/drawing/2010/main" w="9525">
+                <a:solidFill>
+                  <a:schemeClr val="tx1"/>
+                </a:solidFill>
+                <a:miter lim="800000"/>
+                <a:headEnd/>
+                <a:tailEnd/>
+              </a14:hiddenLine>
+            </a:ext>
+          </a:extLst>
+        </p:spPr>
+      </p:pic>
     </p:spTree>
     <p:extLst>
       <p:ext uri="{BB962C8B-B14F-4D97-AF65-F5344CB8AC3E}">
-        <p14:creationId xmlns:p14="http://schemas.microsoft.com/office/powerpoint/2010/main" val="1070272142"/>
+        <p14:creationId xmlns:p14="http://schemas.microsoft.com/office/powerpoint/2010/main" val="4043446612"/>
       </p:ext>
     </p:extLst>
   </p:cSld>
@@ -6196,141 +6191,71 @@
           <a:lstStyle/>
           <a:p>
             <a:r>
-              <a:rPr lang="en-US" altLang="zh-CN" dirty="0" smtClean="0"/>
-              <a:t>User Stories</a:t>
+              <a:rPr lang="en-US" altLang="zh-CN" dirty="0"/>
+              <a:t>GUI Architecture</a:t>
             </a:r>
             <a:endParaRPr lang="zh-CN" altLang="en-US" dirty="0"/>
           </a:p>
         </p:txBody>
       </p:sp>
-      <p:sp>
-        <p:nvSpPr>
-          <p:cNvPr id="3" name="Content Placeholder 2"/>
-          <p:cNvSpPr>
-            <a:spLocks noGrp="1"/>
-          </p:cNvSpPr>
-          <p:nvPr>
-            <p:ph idx="1"/>
-          </p:nvPr>
-        </p:nvSpPr>
-        <p:spPr/>
-        <p:txBody>
-          <a:bodyPr>
-            <a:normAutofit/>
-          </a:bodyPr>
-          <a:lstStyle/>
-          <a:p>
-            <a:pPr>
-              <a:buFont typeface="Wingdings" panose="05000000000000000000" pitchFamily="2" charset="2"/>
-              <a:buChar char="n"/>
-            </a:pPr>
-            <a:r>
-              <a:rPr lang="en-US" altLang="zh-CN" dirty="0" smtClean="0"/>
-              <a:t>User Stories worked on since sprint 1: </a:t>
-            </a:r>
-            <a:br>
-              <a:rPr lang="en-US" altLang="zh-CN" dirty="0" smtClean="0"/>
-            </a:br>
-            <a:endParaRPr lang="en-US" altLang="zh-CN" dirty="0" smtClean="0"/>
-          </a:p>
-          <a:p>
-            <a:pPr>
-              <a:buFont typeface="Wingdings" panose="05000000000000000000" pitchFamily="2" charset="2"/>
-              <a:buChar char="n"/>
-            </a:pPr>
-            <a:r>
-              <a:rPr lang="en-US" altLang="zh-CN" dirty="0" smtClean="0"/>
-              <a:t>Admin User Stories</a:t>
-            </a:r>
-          </a:p>
-          <a:p>
-            <a:pPr lvl="1">
-              <a:buFont typeface="Wingdings" panose="05000000000000000000" pitchFamily="2" charset="2"/>
-              <a:buChar char="n"/>
-            </a:pPr>
-            <a:r>
-              <a:rPr lang="en-US" dirty="0"/>
-              <a:t>As the owner I would like to indicate clothing requirements per class</a:t>
-            </a:r>
-            <a:r>
-              <a:rPr lang="en-US" dirty="0" smtClean="0"/>
-              <a:t>.</a:t>
-            </a:r>
-          </a:p>
-          <a:p>
-            <a:pPr lvl="1">
-              <a:buFont typeface="Wingdings" panose="05000000000000000000" pitchFamily="2" charset="2"/>
-              <a:buChar char="n"/>
-            </a:pPr>
-            <a:r>
-              <a:rPr lang="en-US" altLang="zh-CN" dirty="0" smtClean="0"/>
-              <a:t>Modify employee and student information</a:t>
-            </a:r>
-          </a:p>
-          <a:p>
-            <a:pPr lvl="1">
-              <a:buFont typeface="Wingdings" panose="05000000000000000000" pitchFamily="2" charset="2"/>
-              <a:buChar char="n"/>
-            </a:pPr>
-            <a:r>
-              <a:rPr lang="en-US" altLang="zh-CN" dirty="0" smtClean="0"/>
-              <a:t>Adding information to the system</a:t>
-            </a:r>
-            <a:br>
-              <a:rPr lang="en-US" altLang="zh-CN" dirty="0" smtClean="0"/>
-            </a:br>
-            <a:endParaRPr lang="en-US" altLang="zh-CN" dirty="0" smtClean="0"/>
-          </a:p>
-          <a:p>
-            <a:pPr>
-              <a:buFont typeface="Wingdings" panose="05000000000000000000" pitchFamily="2" charset="2"/>
-              <a:buChar char="n"/>
-            </a:pPr>
-            <a:r>
-              <a:rPr lang="en-US" altLang="zh-CN" dirty="0" smtClean="0"/>
-              <a:t>Teacher User Stories</a:t>
-            </a:r>
-          </a:p>
-          <a:p>
-            <a:pPr lvl="1">
-              <a:buFont typeface="Wingdings" panose="05000000000000000000" pitchFamily="2" charset="2"/>
-              <a:buChar char="n"/>
-            </a:pPr>
-            <a:r>
-              <a:rPr lang="en-US" altLang="zh-CN" dirty="0"/>
-              <a:t> </a:t>
-            </a:r>
-            <a:r>
-              <a:rPr lang="en-US" altLang="zh-CN" dirty="0" smtClean="0"/>
-              <a:t>As a teacher I would like to get a class role for each class</a:t>
-            </a:r>
-          </a:p>
-          <a:p>
-            <a:pPr lvl="1">
-              <a:buFont typeface="Wingdings" panose="05000000000000000000" pitchFamily="2" charset="2"/>
-              <a:buChar char="n"/>
-            </a:pPr>
-            <a:r>
-              <a:rPr lang="en-US" altLang="zh-CN" dirty="0" smtClean="0"/>
-              <a:t> As an employee I would like to be able to look up student data</a:t>
-            </a:r>
-          </a:p>
-          <a:p>
-            <a:pPr lvl="1">
-              <a:buFont typeface="Wingdings" panose="05000000000000000000" pitchFamily="2" charset="2"/>
-              <a:buChar char="n"/>
-            </a:pPr>
-            <a:r>
-              <a:rPr lang="en-US" altLang="zh-CN" dirty="0" smtClean="0"/>
-              <a:t> As an employee I would like to be able to add </a:t>
-            </a:r>
-          </a:p>
-        </p:txBody>
-      </p:sp>
+      <p:pic>
+        <p:nvPicPr>
+          <p:cNvPr id="1029" name="Picture 5"/>
+          <p:cNvPicPr>
+            <a:picLocks noChangeAspect="1" noChangeArrowheads="1"/>
+          </p:cNvPicPr>
+          <p:nvPr/>
+        </p:nvPicPr>
+        <p:blipFill>
+          <a:blip r:embed="rId2">
+            <a:extLst>
+              <a:ext uri="{28A0092B-C50C-407E-A947-70E740481C1C}">
+                <a14:useLocalDpi xmlns:a14="http://schemas.microsoft.com/office/drawing/2010/main" val="0"/>
+              </a:ext>
+            </a:extLst>
+          </a:blip>
+          <a:srcRect/>
+          <a:stretch>
+            <a:fillRect/>
+          </a:stretch>
+        </p:blipFill>
+        <p:spPr bwMode="auto">
+          <a:xfrm>
+            <a:off x="2176463" y="1859973"/>
+            <a:ext cx="7839075" cy="4405745"/>
+          </a:xfrm>
+          <a:prstGeom prst="rect">
+            <a:avLst/>
+          </a:prstGeom>
+          <a:noFill/>
+          <a:ln>
+            <a:noFill/>
+          </a:ln>
+          <a:extLst>
+            <a:ext uri="{909E8E84-426E-40DD-AFC4-6F175D3DCCD1}">
+              <a14:hiddenFill xmlns:a14="http://schemas.microsoft.com/office/drawing/2010/main">
+                <a:solidFill>
+                  <a:schemeClr val="accent1"/>
+                </a:solidFill>
+              </a14:hiddenFill>
+            </a:ext>
+            <a:ext uri="{91240B29-F687-4F45-9708-019B960494DF}">
+              <a14:hiddenLine xmlns:a14="http://schemas.microsoft.com/office/drawing/2010/main" w="9525">
+                <a:solidFill>
+                  <a:schemeClr val="tx1"/>
+                </a:solidFill>
+                <a:miter lim="800000"/>
+                <a:headEnd/>
+                <a:tailEnd/>
+              </a14:hiddenLine>
+            </a:ext>
+          </a:extLst>
+        </p:spPr>
+      </p:pic>
     </p:spTree>
     <p:extLst>
       <p:ext uri="{BB962C8B-B14F-4D97-AF65-F5344CB8AC3E}">
-        <p14:creationId xmlns:p14="http://schemas.microsoft.com/office/powerpoint/2010/main" val="2910299916"/>
+        <p14:creationId xmlns:p14="http://schemas.microsoft.com/office/powerpoint/2010/main" val="2090915179"/>
       </p:ext>
     </p:extLst>
   </p:cSld>
@@ -6380,18 +6305,10 @@
           <a:lstStyle/>
           <a:p>
             <a:r>
-              <a:rPr lang="en-US" dirty="0" smtClean="0"/>
-              <a:t>Backlog </a:t>
-            </a:r>
-            <a:r>
-              <a:rPr lang="en-US" dirty="0"/>
-              <a:t>S</a:t>
-            </a:r>
-            <a:r>
-              <a:rPr lang="en-US" dirty="0" smtClean="0"/>
-              <a:t>ince Sprint 1 </a:t>
-            </a:r>
-            <a:endParaRPr lang="en-US" dirty="0"/>
+              <a:rPr lang="en-US" altLang="zh-CN" dirty="0" smtClean="0"/>
+              <a:t>User Stories</a:t>
+            </a:r>
+            <a:endParaRPr lang="zh-CN" altLang="en-US" dirty="0"/>
           </a:p>
         </p:txBody>
       </p:sp>
@@ -6414,96 +6331,115 @@
           <a:p>
             <a:pPr>
               <a:buFont typeface="Wingdings" panose="05000000000000000000" pitchFamily="2" charset="2"/>
-              <a:buChar char="§"/>
-            </a:pPr>
-            <a:r>
-              <a:rPr lang="en-US" sz="2400" dirty="0" smtClean="0"/>
-              <a:t>Write database creation script</a:t>
-            </a:r>
+              <a:buChar char="n"/>
+            </a:pPr>
+            <a:r>
+              <a:rPr lang="en-US" altLang="zh-CN" dirty="0" smtClean="0"/>
+              <a:t>User Stories worked on since sprint 1: </a:t>
+            </a:r>
+            <a:br>
+              <a:rPr lang="en-US" altLang="zh-CN" dirty="0" smtClean="0"/>
+            </a:br>
+            <a:endParaRPr lang="en-US" altLang="zh-CN" dirty="0" smtClean="0"/>
           </a:p>
           <a:p>
             <a:pPr>
               <a:buFont typeface="Wingdings" panose="05000000000000000000" pitchFamily="2" charset="2"/>
-              <a:buChar char="§"/>
-            </a:pPr>
-            <a:r>
-              <a:rPr lang="en-US" sz="2400" dirty="0" smtClean="0"/>
-              <a:t>Determine needed GUI pages and path</a:t>
-            </a:r>
+              <a:buChar char="n"/>
+            </a:pPr>
+            <a:r>
+              <a:rPr lang="en-US" altLang="zh-CN" dirty="0" smtClean="0"/>
+              <a:t>Admin User Stories</a:t>
+            </a:r>
+          </a:p>
+          <a:p>
+            <a:pPr lvl="1">
+              <a:buFont typeface="Wingdings" panose="05000000000000000000" pitchFamily="2" charset="2"/>
+              <a:buChar char="n"/>
+            </a:pPr>
+            <a:r>
+              <a:rPr lang="en-US" dirty="0"/>
+              <a:t>As the owner I would like to indicate clothing requirements per class</a:t>
+            </a:r>
+            <a:r>
+              <a:rPr lang="en-US" dirty="0" smtClean="0"/>
+              <a:t>.</a:t>
+            </a:r>
+          </a:p>
+          <a:p>
+            <a:pPr lvl="1">
+              <a:buFont typeface="Wingdings" panose="05000000000000000000" pitchFamily="2" charset="2"/>
+              <a:buChar char="n"/>
+            </a:pPr>
+            <a:r>
+              <a:rPr lang="en-US" altLang="zh-CN" dirty="0" smtClean="0"/>
+              <a:t>Modify employee and student information</a:t>
+            </a:r>
+          </a:p>
+          <a:p>
+            <a:pPr lvl="1">
+              <a:buFont typeface="Wingdings" panose="05000000000000000000" pitchFamily="2" charset="2"/>
+              <a:buChar char="n"/>
+            </a:pPr>
+            <a:r>
+              <a:rPr lang="en-US" altLang="zh-CN" dirty="0" smtClean="0"/>
+              <a:t>Adding information to the system</a:t>
+            </a:r>
+            <a:br>
+              <a:rPr lang="en-US" altLang="zh-CN" dirty="0" smtClean="0"/>
+            </a:br>
+            <a:endParaRPr lang="en-US" altLang="zh-CN" dirty="0" smtClean="0"/>
           </a:p>
           <a:p>
             <a:pPr>
               <a:buFont typeface="Wingdings" panose="05000000000000000000" pitchFamily="2" charset="2"/>
-              <a:buChar char="§"/>
-            </a:pPr>
-            <a:r>
-              <a:rPr lang="en-US" sz="2400" dirty="0" smtClean="0"/>
-              <a:t>Create the log in page with permission levels</a:t>
-            </a:r>
-          </a:p>
-          <a:p>
-            <a:pPr>
-              <a:buFont typeface="Wingdings" panose="05000000000000000000" pitchFamily="2" charset="2"/>
-              <a:buChar char="§"/>
-            </a:pPr>
-            <a:r>
-              <a:rPr lang="en-US" sz="2400" dirty="0" smtClean="0"/>
-              <a:t>Landing pages for admin and teacher</a:t>
-            </a:r>
-          </a:p>
-          <a:p>
-            <a:pPr>
-              <a:buFont typeface="Wingdings" panose="05000000000000000000" pitchFamily="2" charset="2"/>
-              <a:buChar char="§"/>
-            </a:pPr>
-            <a:r>
-              <a:rPr lang="en-US" sz="2400" dirty="0" smtClean="0"/>
-              <a:t>Create various update pages</a:t>
-            </a:r>
-          </a:p>
-          <a:p>
-            <a:pPr>
-              <a:buFont typeface="Wingdings" panose="05000000000000000000" pitchFamily="2" charset="2"/>
-              <a:buChar char="§"/>
-            </a:pPr>
-            <a:r>
-              <a:rPr lang="en-US" sz="2400" dirty="0" smtClean="0"/>
-              <a:t>Create search pages for students, and employees</a:t>
-            </a:r>
-          </a:p>
-          <a:p>
-            <a:pPr>
-              <a:buFont typeface="Wingdings" panose="05000000000000000000" pitchFamily="2" charset="2"/>
-              <a:buChar char="§"/>
-            </a:pPr>
-            <a:r>
-              <a:rPr lang="en-US" sz="2400" dirty="0" smtClean="0"/>
-              <a:t>Add information functions (new class, new teacher etc.)</a:t>
-            </a:r>
-          </a:p>
-          <a:p>
-            <a:pPr>
-              <a:buFont typeface="Wingdings" panose="05000000000000000000" pitchFamily="2" charset="2"/>
-              <a:buChar char="§"/>
-            </a:pPr>
-            <a:r>
-              <a:rPr lang="en-US" sz="2400" dirty="0" smtClean="0"/>
-              <a:t>Class role sheet and assign teacher to class</a:t>
-            </a:r>
-          </a:p>
-          <a:p>
-            <a:pPr>
-              <a:buFont typeface="Wingdings" panose="05000000000000000000" pitchFamily="2" charset="2"/>
-              <a:buChar char="§"/>
-            </a:pPr>
-            <a:endParaRPr lang="en-US" sz="2400" dirty="0" smtClean="0"/>
+              <a:buChar char="n"/>
+            </a:pPr>
+            <a:r>
+              <a:rPr lang="en-US" altLang="zh-CN" dirty="0" smtClean="0"/>
+              <a:t>Teacher User Stories</a:t>
+            </a:r>
+          </a:p>
+          <a:p>
+            <a:pPr lvl="1">
+              <a:buFont typeface="Wingdings" panose="05000000000000000000" pitchFamily="2" charset="2"/>
+              <a:buChar char="n"/>
+            </a:pPr>
+            <a:r>
+              <a:rPr lang="en-US" altLang="zh-CN" dirty="0"/>
+              <a:t> </a:t>
+            </a:r>
+            <a:r>
+              <a:rPr lang="en-US" altLang="zh-CN" dirty="0" smtClean="0"/>
+              <a:t>As a teacher I would like to get a class role for each class</a:t>
+            </a:r>
+          </a:p>
+          <a:p>
+            <a:pPr lvl="1">
+              <a:buFont typeface="Wingdings" panose="05000000000000000000" pitchFamily="2" charset="2"/>
+              <a:buChar char="n"/>
+            </a:pPr>
+            <a:r>
+              <a:rPr lang="en-US" altLang="zh-CN" dirty="0" smtClean="0"/>
+              <a:t> As an employee I would like to be able to look up student data</a:t>
+            </a:r>
+          </a:p>
+          <a:p>
+            <a:pPr lvl="1">
+              <a:buFont typeface="Wingdings" panose="05000000000000000000" pitchFamily="2" charset="2"/>
+              <a:buChar char="n"/>
+            </a:pPr>
+            <a:r>
+              <a:rPr lang="en-US" altLang="zh-CN" dirty="0" smtClean="0"/>
+              <a:t> As an employee I would like to be able to add/remove students from a class</a:t>
+            </a:r>
           </a:p>
         </p:txBody>
       </p:sp>
     </p:spTree>
     <p:extLst>
       <p:ext uri="{BB962C8B-B14F-4D97-AF65-F5344CB8AC3E}">
-        <p14:creationId xmlns:p14="http://schemas.microsoft.com/office/powerpoint/2010/main" val="3635759872"/>
+        <p14:creationId xmlns:p14="http://schemas.microsoft.com/office/powerpoint/2010/main" val="2910299916"/>
       </p:ext>
     </p:extLst>
   </p:cSld>
@@ -6554,7 +6490,15 @@
           <a:p>
             <a:r>
               <a:rPr lang="en-US" dirty="0" smtClean="0"/>
-              <a:t>Remaining Backlog</a:t>
+              <a:t>Backlog </a:t>
+            </a:r>
+            <a:r>
+              <a:rPr lang="en-US" dirty="0"/>
+              <a:t>S</a:t>
+            </a:r>
+            <a:r>
+              <a:rPr lang="en-US" dirty="0" smtClean="0"/>
+              <a:t>ince Sprint 1 </a:t>
             </a:r>
             <a:endParaRPr lang="en-US" dirty="0"/>
           </a:p>
@@ -6582,106 +6526,93 @@
               <a:buChar char="§"/>
             </a:pPr>
             <a:r>
-              <a:rPr lang="en-US" sz="2400" dirty="0"/>
-              <a:t>Research </a:t>
-            </a:r>
-            <a:r>
               <a:rPr lang="en-US" sz="2400" dirty="0" smtClean="0"/>
-              <a:t>box and </a:t>
-            </a:r>
-            <a:r>
-              <a:rPr lang="en-US" sz="2400" dirty="0"/>
-              <a:t>server possibilities  </a:t>
-            </a:r>
+              <a:t>Write database creation script</a:t>
+            </a:r>
+          </a:p>
+          <a:p>
+            <a:pPr>
+              <a:buFont typeface="Wingdings" panose="05000000000000000000" pitchFamily="2" charset="2"/>
+              <a:buChar char="§"/>
+            </a:pPr>
+            <a:r>
+              <a:rPr lang="en-US" sz="2400" dirty="0" smtClean="0"/>
+              <a:t>Determine needed GUI pages and path</a:t>
+            </a:r>
+          </a:p>
+          <a:p>
+            <a:pPr>
+              <a:buFont typeface="Wingdings" panose="05000000000000000000" pitchFamily="2" charset="2"/>
+              <a:buChar char="§"/>
+            </a:pPr>
+            <a:r>
+              <a:rPr lang="en-US" sz="2400" dirty="0" smtClean="0"/>
+              <a:t>Create the log in page with permission levels</a:t>
+            </a:r>
+          </a:p>
+          <a:p>
+            <a:pPr>
+              <a:buFont typeface="Wingdings" panose="05000000000000000000" pitchFamily="2" charset="2"/>
+              <a:buChar char="§"/>
+            </a:pPr>
+            <a:r>
+              <a:rPr lang="en-US" sz="2400" dirty="0" smtClean="0"/>
+              <a:t>Landing pages for admin and teacher</a:t>
+            </a:r>
+          </a:p>
+          <a:p>
+            <a:pPr>
+              <a:buFont typeface="Wingdings" panose="05000000000000000000" pitchFamily="2" charset="2"/>
+              <a:buChar char="§"/>
+            </a:pPr>
+            <a:r>
+              <a:rPr lang="en-US" sz="2400" dirty="0" smtClean="0"/>
+              <a:t>Create various update pages</a:t>
+            </a:r>
+          </a:p>
+          <a:p>
+            <a:pPr>
+              <a:buFont typeface="Wingdings" panose="05000000000000000000" pitchFamily="2" charset="2"/>
+              <a:buChar char="§"/>
+            </a:pPr>
+            <a:r>
+              <a:rPr lang="en-US" sz="2400" dirty="0" smtClean="0"/>
+              <a:t>Create search pages for students, and employees</a:t>
+            </a:r>
+          </a:p>
+          <a:p>
+            <a:pPr>
+              <a:buFont typeface="Wingdings" panose="05000000000000000000" pitchFamily="2" charset="2"/>
+              <a:buChar char="§"/>
+            </a:pPr>
+            <a:r>
+              <a:rPr lang="en-US" sz="2400" dirty="0" smtClean="0"/>
+              <a:t>Add information functions (new class, new teacher etc.)</a:t>
+            </a:r>
+          </a:p>
+          <a:p>
+            <a:pPr>
+              <a:buFont typeface="Wingdings" panose="05000000000000000000" pitchFamily="2" charset="2"/>
+              <a:buChar char="§"/>
+            </a:pPr>
+            <a:r>
+              <a:rPr lang="en-US" sz="2400" dirty="0" smtClean="0"/>
+              <a:t>Class role sheet and assign teacher to class</a:t>
+            </a:r>
+          </a:p>
+          <a:p>
+            <a:pPr>
+              <a:buFont typeface="Wingdings" panose="05000000000000000000" pitchFamily="2" charset="2"/>
+              <a:buChar char="§"/>
+            </a:pPr>
             <a:endParaRPr lang="en-US" sz="2400" dirty="0" smtClean="0"/>
-          </a:p>
-          <a:p>
-            <a:pPr>
-              <a:buFont typeface="Wingdings" panose="05000000000000000000" pitchFamily="2" charset="2"/>
-              <a:buChar char="§"/>
-            </a:pPr>
-            <a:r>
-              <a:rPr lang="en-US" sz="2400" dirty="0" smtClean="0"/>
-              <a:t>Student interface and functions</a:t>
-            </a:r>
-          </a:p>
-          <a:p>
-            <a:pPr lvl="1">
-              <a:buFont typeface="Wingdings" panose="05000000000000000000" pitchFamily="2" charset="2"/>
-              <a:buChar char="§"/>
-            </a:pPr>
-            <a:r>
-              <a:rPr lang="en-US" sz="2400" dirty="0" smtClean="0"/>
-              <a:t>Register</a:t>
-            </a:r>
-          </a:p>
-          <a:p>
-            <a:pPr lvl="1">
-              <a:buFont typeface="Wingdings" panose="05000000000000000000" pitchFamily="2" charset="2"/>
-              <a:buChar char="§"/>
-            </a:pPr>
-            <a:r>
-              <a:rPr lang="en-US" sz="2400" dirty="0" smtClean="0"/>
-              <a:t>Sign up for classes</a:t>
-            </a:r>
-          </a:p>
-          <a:p>
-            <a:pPr>
-              <a:buFont typeface="Wingdings" panose="05000000000000000000" pitchFamily="2" charset="2"/>
-              <a:buChar char="§"/>
-            </a:pPr>
-            <a:r>
-              <a:rPr lang="en-US" sz="2400" dirty="0" smtClean="0"/>
-              <a:t>Payroll and Billing Interface</a:t>
-            </a:r>
-          </a:p>
-          <a:p>
-            <a:pPr lvl="1">
-              <a:buFont typeface="Wingdings" panose="05000000000000000000" pitchFamily="2" charset="2"/>
-              <a:buChar char="§"/>
-            </a:pPr>
-            <a:r>
-              <a:rPr lang="en-US" sz="2400" dirty="0" smtClean="0"/>
-              <a:t>Track hours</a:t>
-            </a:r>
-          </a:p>
-          <a:p>
-            <a:pPr lvl="1">
-              <a:buFont typeface="Wingdings" panose="05000000000000000000" pitchFamily="2" charset="2"/>
-              <a:buChar char="§"/>
-            </a:pPr>
-            <a:r>
-              <a:rPr lang="en-US" sz="2400" dirty="0" smtClean="0"/>
-              <a:t>Calculate pay</a:t>
-            </a:r>
-          </a:p>
-          <a:p>
-            <a:pPr lvl="1">
-              <a:buFont typeface="Wingdings" panose="05000000000000000000" pitchFamily="2" charset="2"/>
-              <a:buChar char="§"/>
-            </a:pPr>
-            <a:r>
-              <a:rPr lang="en-US" sz="2400" dirty="0" smtClean="0"/>
-              <a:t>Tuition functions</a:t>
-            </a:r>
-          </a:p>
-          <a:p>
-            <a:pPr>
-              <a:buFont typeface="Wingdings" panose="05000000000000000000" pitchFamily="2" charset="2"/>
-              <a:buChar char="§"/>
-            </a:pPr>
-            <a:r>
-              <a:rPr lang="en-US" sz="2600" dirty="0" smtClean="0"/>
-              <a:t>Clean up GUI</a:t>
-            </a:r>
-            <a:endParaRPr lang="en-US" sz="2600" dirty="0"/>
           </a:p>
         </p:txBody>
       </p:sp>
     </p:spTree>
     <p:extLst>
       <p:ext uri="{BB962C8B-B14F-4D97-AF65-F5344CB8AC3E}">
-        <p14:creationId xmlns:p14="http://schemas.microsoft.com/office/powerpoint/2010/main" val="2295940579"/>
+        <p14:creationId xmlns:p14="http://schemas.microsoft.com/office/powerpoint/2010/main" val="3635759872"/>
       </p:ext>
     </p:extLst>
   </p:cSld>
@@ -6732,14 +6663,7 @@
           <a:p>
             <a:r>
               <a:rPr lang="en-US" dirty="0" smtClean="0"/>
-              <a:t/>
-            </a:r>
-            <a:br>
-              <a:rPr lang="en-US" dirty="0" smtClean="0"/>
-            </a:br>
-            <a:r>
-              <a:rPr lang="en-US" dirty="0" smtClean="0"/>
-              <a:t>Architecture and Design</a:t>
+              <a:t>Remaining Backlog</a:t>
             </a:r>
             <a:endParaRPr lang="en-US" dirty="0"/>
           </a:p>
@@ -6757,21 +6681,116 @@
         </p:nvSpPr>
         <p:spPr/>
         <p:txBody>
-          <a:bodyPr/>
-          <a:lstStyle/>
-          <a:p>
-            <a:r>
-              <a:rPr lang="en-US" dirty="0" smtClean="0"/>
-              <a:t>Need to Fill this section</a:t>
-            </a:r>
-            <a:endParaRPr lang="en-US" dirty="0"/>
+          <a:bodyPr>
+            <a:normAutofit/>
+          </a:bodyPr>
+          <a:lstStyle/>
+          <a:p>
+            <a:pPr>
+              <a:buFont typeface="Wingdings" panose="05000000000000000000" pitchFamily="2" charset="2"/>
+              <a:buChar char="§"/>
+            </a:pPr>
+            <a:r>
+              <a:rPr lang="en-US" sz="2400" dirty="0"/>
+              <a:t>Research </a:t>
+            </a:r>
+            <a:r>
+              <a:rPr lang="en-US" sz="2400" dirty="0" smtClean="0"/>
+              <a:t>box and </a:t>
+            </a:r>
+            <a:r>
+              <a:rPr lang="en-US" sz="2400" dirty="0"/>
+              <a:t>server possibilities  </a:t>
+            </a:r>
+            <a:endParaRPr lang="en-US" sz="2400" dirty="0" smtClean="0"/>
+          </a:p>
+          <a:p>
+            <a:pPr>
+              <a:buFont typeface="Wingdings" panose="05000000000000000000" pitchFamily="2" charset="2"/>
+              <a:buChar char="§"/>
+            </a:pPr>
+            <a:r>
+              <a:rPr lang="en-US" sz="2400" dirty="0" smtClean="0"/>
+              <a:t>Student interface and functions</a:t>
+            </a:r>
+          </a:p>
+          <a:p>
+            <a:pPr lvl="1">
+              <a:buFont typeface="Wingdings" panose="05000000000000000000" pitchFamily="2" charset="2"/>
+              <a:buChar char="§"/>
+            </a:pPr>
+            <a:r>
+              <a:rPr lang="en-US" sz="2400" dirty="0" smtClean="0"/>
+              <a:t>Register</a:t>
+            </a:r>
+          </a:p>
+          <a:p>
+            <a:pPr lvl="1">
+              <a:buFont typeface="Wingdings" panose="05000000000000000000" pitchFamily="2" charset="2"/>
+              <a:buChar char="§"/>
+            </a:pPr>
+            <a:r>
+              <a:rPr lang="en-US" sz="2400" dirty="0" smtClean="0"/>
+              <a:t>Sign up for classes</a:t>
+            </a:r>
+          </a:p>
+          <a:p>
+            <a:pPr>
+              <a:buFont typeface="Wingdings" panose="05000000000000000000" pitchFamily="2" charset="2"/>
+              <a:buChar char="§"/>
+            </a:pPr>
+            <a:r>
+              <a:rPr lang="en-US" sz="2400" dirty="0" smtClean="0"/>
+              <a:t>Payroll and Billing Interface</a:t>
+            </a:r>
+          </a:p>
+          <a:p>
+            <a:pPr lvl="1">
+              <a:buFont typeface="Wingdings" panose="05000000000000000000" pitchFamily="2" charset="2"/>
+              <a:buChar char="§"/>
+            </a:pPr>
+            <a:r>
+              <a:rPr lang="en-US" sz="2400" dirty="0" smtClean="0"/>
+              <a:t>Track hours</a:t>
+            </a:r>
+          </a:p>
+          <a:p>
+            <a:pPr lvl="1">
+              <a:buFont typeface="Wingdings" panose="05000000000000000000" pitchFamily="2" charset="2"/>
+              <a:buChar char="§"/>
+            </a:pPr>
+            <a:r>
+              <a:rPr lang="en-US" sz="2400" dirty="0" smtClean="0"/>
+              <a:t>Calculate pay</a:t>
+            </a:r>
+          </a:p>
+          <a:p>
+            <a:pPr lvl="1">
+              <a:buFont typeface="Wingdings" panose="05000000000000000000" pitchFamily="2" charset="2"/>
+              <a:buChar char="§"/>
+            </a:pPr>
+            <a:r>
+              <a:rPr lang="en-US" sz="2400" dirty="0" smtClean="0"/>
+              <a:t>Tuition functions</a:t>
+            </a:r>
+          </a:p>
+          <a:p>
+            <a:pPr>
+              <a:buFont typeface="Wingdings" panose="05000000000000000000" pitchFamily="2" charset="2"/>
+              <a:buChar char="§"/>
+            </a:pPr>
+            <a:r>
+              <a:rPr lang="en-US" sz="2600" dirty="0" smtClean="0"/>
+              <a:t>Clean up GUI</a:t>
+            </a:r>
+            <a:endParaRPr lang="en-US" sz="2600" dirty="0"/>
           </a:p>
         </p:txBody>
       </p:sp>
     </p:spTree>
     <p:extLst>
       <p:ext uri="{BB962C8B-B14F-4D97-AF65-F5344CB8AC3E}">
-        <p14:creationId xmlns:p14="http://schemas.microsoft.com/office/powerpoint/2010/main" val="1390917279"/>
+        <p14:creationId xmlns:p14="http://schemas.microsoft.com/office/powerpoint/2010/main" val="2295940579"/>
       </p:ext>
     </p:extLst>
   </p:cSld>

</xml_diff>